<commit_message>
Fixed dates to reflect current update
No actual changes needed for the WDS
</commit_message>
<xml_diff>
--- a/Whiteboard design session/WDS trainer presentation - Enterprise-ready cloud.pptx
+++ b/Whiteboard design session/WDS trainer presentation - Enterprise-ready cloud.pptx
@@ -240,7 +240,7 @@
           <a:p>
             <a:fld id="{52A13B17-C506-4D51-BB37-16B365906619}" type="datetimeFigureOut">
               <a:rPr lang="en-US" smtClean="0"/>
-              <a:t>4/25/2019</a:t>
+              <a:t>8/19/19</a:t>
             </a:fld>
             <a:endParaRPr lang="en-US" dirty="0"/>
           </a:p>
@@ -610,6 +610,25 @@
               <a:t> are trademarks of the Microsoft group of companies. All other trademarks are property of their respective owners.</a:t>
             </a:r>
           </a:p>
+          <a:p>
+            <a:endParaRPr lang="en-US" sz="950" dirty="0">
+              <a:latin typeface="+mn-lt"/>
+              <a:cs typeface="Segoe UI" panose="020B0502040204020203" pitchFamily="34" charset="0"/>
+            </a:endParaRPr>
+          </a:p>
+          <a:p>
+            <a:r>
+              <a:rPr lang="en-US" sz="950">
+                <a:latin typeface="+mn-lt"/>
+                <a:cs typeface="Segoe UI" panose="020B0502040204020203" pitchFamily="34" charset="0"/>
+              </a:rPr>
+              <a:t>August 2019</a:t>
+            </a:r>
+            <a:endParaRPr lang="en-US" sz="950" dirty="0">
+              <a:latin typeface="+mn-lt"/>
+              <a:cs typeface="Segoe UI" panose="020B0502040204020203" pitchFamily="34" charset="0"/>
+            </a:endParaRPr>
+          </a:p>
         </p:txBody>
       </p:sp>
       <p:sp>
@@ -6635,7 +6654,7 @@
                   <a:prstClr val="black"/>
                 </a:solidFill>
               </a:rPr>
-              <a:t>4/25/2019 12:04 PM</a:t>
+              <a:t>8/19/19 3:28 PM</a:t>
             </a:fld>
             <a:endParaRPr lang="en-US" dirty="0">
               <a:solidFill>
@@ -7942,7 +7961,7 @@
       </p:transition>
     </mc:Fallback>
   </mc:AlternateContent>
-  <p:extLst mod="1">
+  <p:extLst>
     <p:ext uri="{DCECCB84-F9BA-43D5-87BE-67443E8EF086}">
       <p15:sldGuideLst xmlns:p15="http://schemas.microsoft.com/office/powerpoint/2012/main">
         <p15:guide id="1" pos="288">
@@ -18947,7 +18966,7 @@
       </a:lvl9pPr>
     </p:otherStyle>
   </p:txStyles>
-  <p:extLst mod="1">
+  <p:extLst>
     <p:ext uri="{27BBF7A9-308A-43DC-89C8-2F10F3537804}">
       <p15:sldGuideLst xmlns:p15="http://schemas.microsoft.com/office/powerpoint/2012/main">
         <p15:guide id="1" orient="horz" pos="187">
@@ -19562,7 +19581,7 @@
       </a:lvl9pPr>
     </p:otherStyle>
   </p:txStyles>
-  <p:extLst mod="1">
+  <p:extLst>
     <p:ext uri="{27BBF7A9-308A-43DC-89C8-2F10F3537804}">
       <p15:sldGuideLst xmlns:p15="http://schemas.microsoft.com/office/powerpoint/2012/main">
         <p15:guide id="1" orient="horz" pos="187">

</xml_diff>